<commit_message>
Removed references to assignments.
</commit_message>
<xml_diff>
--- a/OSL640-Week11.pptx
+++ b/OSL640-Week11.pptx
@@ -368,7 +368,7 @@
           <a:p>
             <a:fld id="{92107E4A-59D9-C648-BC62-133DA4EC414F}" type="datetimeFigureOut">
               <a:rPr lang="en-US" smtClean="0"/>
-              <a:t>9/6/2021</a:t>
+              <a:t>8/4/2023</a:t>
             </a:fld>
             <a:endParaRPr lang="en-US"/>
           </a:p>
@@ -774,7 +774,7 @@
           <a:p>
             <a:fld id="{4AB1357F-A277-7442-BEE7-4FE250216E54}" type="datetimeFigureOut">
               <a:rPr lang="en-US" smtClean="0"/>
-              <a:t>9/6/2021</a:t>
+              <a:t>8/4/2023</a:t>
             </a:fld>
             <a:endParaRPr lang="en-US"/>
           </a:p>
@@ -985,7 +985,7 @@
           <a:p>
             <a:fld id="{4AB1357F-A277-7442-BEE7-4FE250216E54}" type="datetimeFigureOut">
               <a:rPr lang="en-US" smtClean="0"/>
-              <a:t>9/6/2021</a:t>
+              <a:t>8/4/2023</a:t>
             </a:fld>
             <a:endParaRPr lang="en-US"/>
           </a:p>
@@ -1200,7 +1200,7 @@
           <a:p>
             <a:fld id="{4AB1357F-A277-7442-BEE7-4FE250216E54}" type="datetimeFigureOut">
               <a:rPr lang="en-US" smtClean="0"/>
-              <a:t>9/6/2021</a:t>
+              <a:t>8/4/2023</a:t>
             </a:fld>
             <a:endParaRPr lang="en-US"/>
           </a:p>
@@ -1401,7 +1401,7 @@
           <a:p>
             <a:fld id="{4AB1357F-A277-7442-BEE7-4FE250216E54}" type="datetimeFigureOut">
               <a:rPr lang="en-US" smtClean="0"/>
-              <a:t>9/6/2021</a:t>
+              <a:t>8/4/2023</a:t>
             </a:fld>
             <a:endParaRPr lang="en-US"/>
           </a:p>
@@ -1680,7 +1680,7 @@
           <a:p>
             <a:fld id="{4AB1357F-A277-7442-BEE7-4FE250216E54}" type="datetimeFigureOut">
               <a:rPr lang="en-US" smtClean="0"/>
-              <a:t>9/6/2021</a:t>
+              <a:t>8/4/2023</a:t>
             </a:fld>
             <a:endParaRPr lang="en-US"/>
           </a:p>
@@ -1948,7 +1948,7 @@
           <a:p>
             <a:fld id="{4AB1357F-A277-7442-BEE7-4FE250216E54}" type="datetimeFigureOut">
               <a:rPr lang="en-US" smtClean="0"/>
-              <a:t>9/6/2021</a:t>
+              <a:t>8/4/2023</a:t>
             </a:fld>
             <a:endParaRPr lang="en-US"/>
           </a:p>
@@ -2364,7 +2364,7 @@
           <a:p>
             <a:fld id="{4AB1357F-A277-7442-BEE7-4FE250216E54}" type="datetimeFigureOut">
               <a:rPr lang="en-US" smtClean="0"/>
-              <a:t>9/6/2021</a:t>
+              <a:t>8/4/2023</a:t>
             </a:fld>
             <a:endParaRPr lang="en-US"/>
           </a:p>
@@ -2513,7 +2513,7 @@
           <a:p>
             <a:fld id="{4AB1357F-A277-7442-BEE7-4FE250216E54}" type="datetimeFigureOut">
               <a:rPr lang="en-US" smtClean="0"/>
-              <a:t>9/6/2021</a:t>
+              <a:t>8/4/2023</a:t>
             </a:fld>
             <a:endParaRPr lang="en-US"/>
           </a:p>
@@ -2639,7 +2639,7 @@
           <a:p>
             <a:fld id="{4AB1357F-A277-7442-BEE7-4FE250216E54}" type="datetimeFigureOut">
               <a:rPr lang="en-US" smtClean="0"/>
-              <a:t>9/6/2021</a:t>
+              <a:t>8/4/2023</a:t>
             </a:fld>
             <a:endParaRPr lang="en-US"/>
           </a:p>
@@ -2890,7 +2890,7 @@
           <a:p>
             <a:fld id="{4AB1357F-A277-7442-BEE7-4FE250216E54}" type="datetimeFigureOut">
               <a:rPr lang="en-US" smtClean="0"/>
-              <a:t>9/6/2021</a:t>
+              <a:t>8/4/2023</a:t>
             </a:fld>
             <a:endParaRPr lang="en-US"/>
           </a:p>
@@ -3335,7 +3335,7 @@
           <a:p>
             <a:fld id="{4AB1357F-A277-7442-BEE7-4FE250216E54}" type="datetimeFigureOut">
               <a:rPr lang="en-US" smtClean="0"/>
-              <a:t>9/6/2021</a:t>
+              <a:t>8/4/2023</a:t>
             </a:fld>
             <a:endParaRPr lang="en-US"/>
           </a:p>
@@ -3662,7 +3662,7 @@
           <a:p>
             <a:fld id="{4AB1357F-A277-7442-BEE7-4FE250216E54}" type="datetimeFigureOut">
               <a:rPr lang="en-US" smtClean="0"/>
-              <a:t>9/6/2021</a:t>
+              <a:t>8/4/2023</a:t>
             </a:fld>
             <a:endParaRPr lang="en-US"/>
           </a:p>
@@ -6890,23 +6890,7 @@
             </a:pPr>
             <a:r>
               <a:rPr lang="en-CA" dirty="0"/>
-              <a:t>To get practice to help perform </a:t>
-            </a:r>
-            <a:r>
-              <a:rPr lang="en-CA" b="1" dirty="0"/>
-              <a:t>online</a:t>
-            </a:r>
-            <a:r>
-              <a:rPr lang="en-CA" dirty="0"/>
-              <a:t> </a:t>
-            </a:r>
-            <a:r>
-              <a:rPr lang="en-CA" b="1" dirty="0"/>
-              <a:t>assignment #3</a:t>
-            </a:r>
-            <a:r>
-              <a:rPr lang="en-CA" dirty="0"/>
-              <a:t>, perform </a:t>
+              <a:t>To get practice perform </a:t>
             </a:r>
             <a:r>
               <a:rPr lang="en-CA" b="1" dirty="0"/>
@@ -20858,15 +20842,11 @@
             </a:pPr>
             <a:r>
               <a:rPr lang="en-CA" dirty="0"/>
-              <a:t>To get practice to help perform </a:t>
-            </a:r>
-            <a:r>
-              <a:rPr lang="en-CA" b="1" dirty="0"/>
-              <a:t>online assignment #3</a:t>
-            </a:r>
-            <a:r>
-              <a:rPr lang="en-CA" dirty="0"/>
-              <a:t>, perform </a:t>
+              <a:t>To get </a:t>
+            </a:r>
+            <a:r>
+              <a:rPr lang="en-CA"/>
+              <a:t>practice to perform </a:t>
             </a:r>
             <a:r>
               <a:rPr lang="en-CA" b="1" dirty="0"/>
@@ -20911,11 +20891,11 @@
               <a:t> and </a:t>
             </a:r>
             <a:r>
-              <a:rPr lang="en-CA" sz="2000" b="1"/>
+              <a:rPr lang="en-CA" sz="2000" b="1" dirty="0"/>
               <a:t>D</a:t>
             </a:r>
             <a:r>
-              <a:rPr lang="en-CA"/>
+              <a:rPr lang="en-CA" dirty="0"/>
               <a:t>)</a:t>
             </a:r>
             <a:br>
@@ -20927,7 +20907,7 @@
             <a:br>
               <a:rPr lang="en-US" dirty="0"/>
             </a:br>
-            <a:endParaRPr lang="en-US"/>
+            <a:endParaRPr lang="en-US" dirty="0"/>
           </a:p>
           <a:p>
             <a:pPr marL="0" indent="0">
@@ -25604,6 +25584,14 @@
 </file>
 
 <file path=customXml/item1.xml><?xml version="1.0" encoding="utf-8"?>
+<p:properties xmlns:p="http://schemas.microsoft.com/office/2006/metadata/properties" xmlns:xsi="http://www.w3.org/2001/XMLSchema-instance" xmlns:pc="http://schemas.microsoft.com/office/infopath/2007/PartnerControls">
+  <documentManagement>
+    <Topic xmlns="83d6e24e-72d9-475f-86bc-baec43385f3c" xsi:nil="true"/>
+  </documentManagement>
+</p:properties>
+</file>
+
+<file path=customXml/item2.xml><?xml version="1.0" encoding="utf-8"?>
 <ct:contentTypeSchema xmlns:ct="http://schemas.microsoft.com/office/2006/metadata/contentType" xmlns:ma="http://schemas.microsoft.com/office/2006/metadata/properties/metaAttributes" ct:_="" ma:_="" ma:contentTypeName="Document" ma:contentTypeID="0x01010056452DA2941485459CFE4F1403BD78A3" ma:contentTypeVersion="9" ma:contentTypeDescription="Create a new document." ma:contentTypeScope="" ma:versionID="357b321f808c3dafe873831e74252754">
   <xsd:schema xmlns:xsd="http://www.w3.org/2001/XMLSchema" xmlns:xs="http://www.w3.org/2001/XMLSchema" xmlns:p="http://schemas.microsoft.com/office/2006/metadata/properties" xmlns:ns2="83d6e24e-72d9-475f-86bc-baec43385f3c" targetNamespace="http://schemas.microsoft.com/office/2006/metadata/properties" ma:root="true" ma:fieldsID="420a8f89f5a6e51c7100d689e8b47153" ns2:_="">
     <xsd:import namespace="83d6e24e-72d9-475f-86bc-baec43385f3c"/>
@@ -25783,14 +25771,6 @@
 </ct:contentTypeSchema>
 </file>
 
-<file path=customXml/item2.xml><?xml version="1.0" encoding="utf-8"?>
-<p:properties xmlns:p="http://schemas.microsoft.com/office/2006/metadata/properties" xmlns:xsi="http://www.w3.org/2001/XMLSchema-instance" xmlns:pc="http://schemas.microsoft.com/office/infopath/2007/PartnerControls">
-  <documentManagement>
-    <Topic xmlns="83d6e24e-72d9-475f-86bc-baec43385f3c" xsi:nil="true"/>
-  </documentManagement>
-</p:properties>
-</file>
-
 <file path=customXml/item3.xml><?xml version="1.0" encoding="utf-8"?>
 <?mso-contentType ?>
 <FormTemplates xmlns="http://schemas.microsoft.com/sharepoint/v3/contenttype/forms">
@@ -25801,6 +25781,22 @@
 </file>
 
 <file path=customXml/itemProps1.xml><?xml version="1.0" encoding="utf-8"?>
+<ds:datastoreItem xmlns:ds="http://schemas.openxmlformats.org/officeDocument/2006/customXml" ds:itemID="{DC5777D3-765C-408A-BC86-56A5B0F14EF4}">
+  <ds:schemaRefs>
+    <ds:schemaRef ds:uri="http://schemas.microsoft.com/office/2006/documentManagement/types"/>
+    <ds:schemaRef ds:uri="http://purl.org/dc/dcmitype/"/>
+    <ds:schemaRef ds:uri="http://schemas.microsoft.com/office/2006/metadata/properties"/>
+    <ds:schemaRef ds:uri="http://schemas.microsoft.com/office/infopath/2007/PartnerControls"/>
+    <ds:schemaRef ds:uri="http://purl.org/dc/terms/"/>
+    <ds:schemaRef ds:uri="http://schemas.openxmlformats.org/package/2006/metadata/core-properties"/>
+    <ds:schemaRef ds:uri="83d6e24e-72d9-475f-86bc-baec43385f3c"/>
+    <ds:schemaRef ds:uri="http://www.w3.org/XML/1998/namespace"/>
+    <ds:schemaRef ds:uri="http://purl.org/dc/elements/1.1/"/>
+  </ds:schemaRefs>
+</ds:datastoreItem>
+</file>
+
+<file path=customXml/itemProps2.xml><?xml version="1.0" encoding="utf-8"?>
 <ds:datastoreItem xmlns:ds="http://schemas.openxmlformats.org/officeDocument/2006/customXml" ds:itemID="{C0389562-A2E8-41B5-BA8B-BAC499A6BBA4}">
   <ds:schemaRefs>
     <ds:schemaRef ds:uri="http://schemas.microsoft.com/office/2006/metadata/contentType"/>
@@ -25818,22 +25814,6 @@
 </ds:datastoreItem>
 </file>
 
-<file path=customXml/itemProps2.xml><?xml version="1.0" encoding="utf-8"?>
-<ds:datastoreItem xmlns:ds="http://schemas.openxmlformats.org/officeDocument/2006/customXml" ds:itemID="{DC5777D3-765C-408A-BC86-56A5B0F14EF4}">
-  <ds:schemaRefs>
-    <ds:schemaRef ds:uri="http://schemas.microsoft.com/office/2006/documentManagement/types"/>
-    <ds:schemaRef ds:uri="http://purl.org/dc/dcmitype/"/>
-    <ds:schemaRef ds:uri="http://schemas.microsoft.com/office/2006/metadata/properties"/>
-    <ds:schemaRef ds:uri="http://schemas.microsoft.com/office/infopath/2007/PartnerControls"/>
-    <ds:schemaRef ds:uri="http://purl.org/dc/terms/"/>
-    <ds:schemaRef ds:uri="http://schemas.openxmlformats.org/package/2006/metadata/core-properties"/>
-    <ds:schemaRef ds:uri="83d6e24e-72d9-475f-86bc-baec43385f3c"/>
-    <ds:schemaRef ds:uri="http://www.w3.org/XML/1998/namespace"/>
-    <ds:schemaRef ds:uri="http://purl.org/dc/elements/1.1/"/>
-  </ds:schemaRefs>
-</ds:datastoreItem>
-</file>
-
 <file path=customXml/itemProps3.xml><?xml version="1.0" encoding="utf-8"?>
 <ds:datastoreItem xmlns:ds="http://schemas.openxmlformats.org/officeDocument/2006/customXml" ds:itemID="{E48D17BD-6850-4540-8CF0-B04BFF54D65E}">
   <ds:schemaRefs>

</xml_diff>